<commit_message>
Apresentacão PLP - Java Funcional
</commit_message>
<xml_diff>
--- a/Programação Funcional – Java 8.pptx
+++ b/Programação Funcional – Java 8.pptx
@@ -11,13 +11,16 @@
     <p:sldId id="258" r:id="rId5"/>
     <p:sldId id="264" r:id="rId6"/>
     <p:sldId id="259" r:id="rId7"/>
-    <p:sldId id="265" r:id="rId8"/>
-    <p:sldId id="260" r:id="rId9"/>
-    <p:sldId id="266" r:id="rId10"/>
-    <p:sldId id="261" r:id="rId11"/>
-    <p:sldId id="267" r:id="rId12"/>
-    <p:sldId id="262" r:id="rId13"/>
-    <p:sldId id="270" r:id="rId14"/>
+    <p:sldId id="271" r:id="rId8"/>
+    <p:sldId id="265" r:id="rId9"/>
+    <p:sldId id="260" r:id="rId10"/>
+    <p:sldId id="272" r:id="rId11"/>
+    <p:sldId id="266" r:id="rId12"/>
+    <p:sldId id="261" r:id="rId13"/>
+    <p:sldId id="273" r:id="rId14"/>
+    <p:sldId id="267" r:id="rId15"/>
+    <p:sldId id="262" r:id="rId16"/>
+    <p:sldId id="270" r:id="rId17"/>
   </p:sldIdLst>
   <p:sldSz cx="12192000" cy="6858000"/>
   <p:notesSz cx="6858000" cy="9144000"/>
@@ -5963,95 +5966,48 @@
             <p:ph type="title"/>
           </p:nvPr>
         </p:nvSpPr>
+        <p:spPr/>
+        <p:txBody>
+          <a:bodyPr/>
+          <a:lstStyle/>
+          <a:p>
+            <a:r>
+              <a:rPr lang="pt-BR" dirty="0"/>
+              <a:t>Antes</a:t>
+            </a:r>
+          </a:p>
+        </p:txBody>
+      </p:sp>
+      <p:pic>
+        <p:nvPicPr>
+          <p:cNvPr id="7" name="Espaço Reservado para Conteúdo 6"/>
+          <p:cNvPicPr>
+            <a:picLocks noGrp="1" noChangeAspect="1"/>
+          </p:cNvPicPr>
+          <p:nvPr>
+            <p:ph idx="1"/>
+          </p:nvPr>
+        </p:nvPicPr>
+        <p:blipFill>
+          <a:blip r:embed="rId2"/>
+          <a:stretch>
+            <a:fillRect/>
+          </a:stretch>
+        </p:blipFill>
         <p:spPr>
           <a:xfrm>
-            <a:off x="1103312" y="452718"/>
-            <a:ext cx="8947522" cy="1400530"/>
+            <a:off x="677334" y="1930400"/>
+            <a:ext cx="7098486" cy="1994486"/>
           </a:xfrm>
+          <a:prstGeom prst="rect">
+            <a:avLst/>
+          </a:prstGeom>
         </p:spPr>
-        <p:txBody>
-          <a:bodyPr/>
-          <a:lstStyle/>
-          <a:p>
-            <a:r>
-              <a:rPr lang="pt-BR" dirty="0"/>
-              <a:t>Data e Hora</a:t>
-            </a:r>
-          </a:p>
-        </p:txBody>
-      </p:sp>
-      <p:sp>
-        <p:nvSpPr>
-          <p:cNvPr id="3" name="Espaço Reservado para Conteúdo 2"/>
-          <p:cNvSpPr>
-            <a:spLocks noGrp="1"/>
-          </p:cNvSpPr>
-          <p:nvPr>
-            <p:ph idx="1"/>
-          </p:nvPr>
-        </p:nvSpPr>
-        <p:spPr/>
-        <p:txBody>
-          <a:bodyPr/>
-          <a:lstStyle/>
-          <a:p>
-            <a:pPr marL="0" indent="0">
-              <a:buNone/>
-            </a:pPr>
-            <a:r>
-              <a:rPr lang="pt-BR" sz="2800" dirty="0" err="1"/>
-              <a:t>LocalDateTime</a:t>
-            </a:r>
-            <a:r>
-              <a:rPr lang="pt-BR" dirty="0"/>
-              <a:t> </a:t>
-            </a:r>
-          </a:p>
-          <a:p>
-            <a:pPr marL="0" indent="0">
-              <a:buNone/>
-            </a:pPr>
-            <a:r>
-              <a:rPr lang="pt-BR" dirty="0"/>
-              <a:t>Composto por data e horas</a:t>
-            </a:r>
-          </a:p>
-          <a:p>
-            <a:pPr marL="0" indent="0">
-              <a:buNone/>
-            </a:pPr>
-            <a:r>
-              <a:rPr lang="pt-BR" dirty="0"/>
-              <a:t>Data e hora de um atendimento, da apresentação de PLP...</a:t>
-            </a:r>
-          </a:p>
-          <a:p>
-            <a:pPr marL="0" indent="0">
-              <a:buNone/>
-            </a:pPr>
-            <a:r>
-              <a:rPr lang="pt-BR" dirty="0" err="1"/>
-              <a:t>LocalDateTime.of</a:t>
-            </a:r>
-            <a:r>
-              <a:rPr lang="pt-BR" dirty="0"/>
-              <a:t>(2017, </a:t>
-            </a:r>
-            <a:r>
-              <a:rPr lang="pt-BR" dirty="0" err="1"/>
-              <a:t>Thurth.MAY</a:t>
-            </a:r>
-            <a:r>
-              <a:rPr lang="pt-BR" dirty="0"/>
-              <a:t>, 04, 8, 50);</a:t>
-            </a:r>
-          </a:p>
-        </p:txBody>
-      </p:sp>
+      </p:pic>
     </p:spTree>
     <p:extLst>
       <p:ext uri="{BB962C8B-B14F-4D97-AF65-F5344CB8AC3E}">
-        <p14:creationId xmlns:p14="http://schemas.microsoft.com/office/powerpoint/2010/main" val="703884644"/>
+        <p14:creationId xmlns:p14="http://schemas.microsoft.com/office/powerpoint/2010/main" val="3410311669"/>
       </p:ext>
     </p:extLst>
   </p:cSld>
@@ -6090,8 +6046,8 @@
         </p:nvSpPr>
         <p:spPr>
           <a:xfrm>
-            <a:off x="1103312" y="452718"/>
-            <a:ext cx="8947522" cy="1400530"/>
+            <a:off x="677334" y="592418"/>
+            <a:ext cx="9373500" cy="1400530"/>
           </a:xfrm>
         </p:spPr>
         <p:txBody>
@@ -6099,19 +6055,15 @@
           <a:lstStyle/>
           <a:p>
             <a:r>
-              <a:rPr lang="pt-BR" dirty="0" err="1"/>
-              <a:t>Ex</a:t>
-            </a:r>
-            <a:r>
               <a:rPr lang="pt-BR" dirty="0"/>
-              <a:t>:</a:t>
-            </a:r>
-          </a:p>
-        </p:txBody>
-      </p:sp>
-      <p:sp>
-        <p:nvSpPr>
-          <p:cNvPr id="3" name="Espaço Reservado para Conteúdo 2"/>
+              <a:t>Agora</a:t>
+            </a:r>
+          </a:p>
+        </p:txBody>
+      </p:sp>
+      <p:sp>
+        <p:nvSpPr>
+          <p:cNvPr id="5" name="Espaço Reservado para Conteúdo 4"/>
           <p:cNvSpPr>
             <a:spLocks noGrp="1"/>
           </p:cNvSpPr>
@@ -6124,16 +6076,13 @@
           <a:bodyPr/>
           <a:lstStyle/>
           <a:p>
-            <a:pPr marL="0" indent="0">
-              <a:buNone/>
-            </a:pPr>
-            <a:endParaRPr lang="pt-BR" dirty="0"/>
+            <a:endParaRPr lang="pt-BR"/>
           </a:p>
         </p:txBody>
       </p:sp>
       <p:pic>
         <p:nvPicPr>
-          <p:cNvPr id="4" name="Imagem 3"/>
+          <p:cNvPr id="6" name="Imagem 5"/>
           <p:cNvPicPr>
             <a:picLocks noChangeAspect="1"/>
           </p:cNvPicPr>
@@ -6147,8 +6096,331 @@
         </p:blipFill>
         <p:spPr>
           <a:xfrm>
-            <a:off x="502397" y="2726672"/>
-            <a:ext cx="8946541" cy="1694421"/>
+            <a:off x="677334" y="2160589"/>
+            <a:ext cx="5040886" cy="1466140"/>
+          </a:xfrm>
+          <a:prstGeom prst="rect">
+            <a:avLst/>
+          </a:prstGeom>
+        </p:spPr>
+      </p:pic>
+    </p:spTree>
+    <p:extLst>
+      <p:ext uri="{BB962C8B-B14F-4D97-AF65-F5344CB8AC3E}">
+        <p14:creationId xmlns:p14="http://schemas.microsoft.com/office/powerpoint/2010/main" val="1960338378"/>
+      </p:ext>
+    </p:extLst>
+  </p:cSld>
+  <p:clrMapOvr>
+    <a:masterClrMapping/>
+  </p:clrMapOvr>
+</p:sld>
+</file>
+
+<file path=ppt/slides/slide12.xml><?xml version="1.0" encoding="utf-8"?>
+<p:sld xmlns:a="http://schemas.openxmlformats.org/drawingml/2006/main" xmlns:r="http://schemas.openxmlformats.org/officeDocument/2006/relationships" xmlns:p="http://schemas.openxmlformats.org/presentationml/2006/main">
+  <p:cSld>
+    <p:spTree>
+      <p:nvGrpSpPr>
+        <p:cNvPr id="1" name=""/>
+        <p:cNvGrpSpPr/>
+        <p:nvPr/>
+      </p:nvGrpSpPr>
+      <p:grpSpPr>
+        <a:xfrm>
+          <a:off x="0" y="0"/>
+          <a:ext cx="0" cy="0"/>
+          <a:chOff x="0" y="0"/>
+          <a:chExt cx="0" cy="0"/>
+        </a:xfrm>
+      </p:grpSpPr>
+      <p:sp>
+        <p:nvSpPr>
+          <p:cNvPr id="2" name="Título 1"/>
+          <p:cNvSpPr>
+            <a:spLocks noGrp="1"/>
+          </p:cNvSpPr>
+          <p:nvPr>
+            <p:ph type="title"/>
+          </p:nvPr>
+        </p:nvSpPr>
+        <p:spPr>
+          <a:xfrm>
+            <a:off x="677334" y="452718"/>
+            <a:ext cx="9373500" cy="1400530"/>
+          </a:xfrm>
+        </p:spPr>
+        <p:txBody>
+          <a:bodyPr/>
+          <a:lstStyle/>
+          <a:p>
+            <a:r>
+              <a:rPr lang="pt-BR" dirty="0"/>
+              <a:t>Data e Hora</a:t>
+            </a:r>
+          </a:p>
+        </p:txBody>
+      </p:sp>
+      <p:sp>
+        <p:nvSpPr>
+          <p:cNvPr id="3" name="Espaço Reservado para Conteúdo 2"/>
+          <p:cNvSpPr>
+            <a:spLocks noGrp="1"/>
+          </p:cNvSpPr>
+          <p:nvPr>
+            <p:ph idx="1"/>
+          </p:nvPr>
+        </p:nvSpPr>
+        <p:spPr/>
+        <p:txBody>
+          <a:bodyPr/>
+          <a:lstStyle/>
+          <a:p>
+            <a:pPr marL="0" indent="0">
+              <a:buNone/>
+            </a:pPr>
+            <a:r>
+              <a:rPr lang="pt-BR" sz="2800" dirty="0" err="1"/>
+              <a:t>LocalDateTime</a:t>
+            </a:r>
+            <a:r>
+              <a:rPr lang="pt-BR" dirty="0"/>
+              <a:t> </a:t>
+            </a:r>
+          </a:p>
+          <a:p>
+            <a:pPr marL="0" indent="0">
+              <a:buNone/>
+            </a:pPr>
+            <a:r>
+              <a:rPr lang="pt-BR" dirty="0"/>
+              <a:t>Composto por data e horas</a:t>
+            </a:r>
+          </a:p>
+          <a:p>
+            <a:pPr marL="0" indent="0">
+              <a:buNone/>
+            </a:pPr>
+            <a:r>
+              <a:rPr lang="pt-BR" dirty="0"/>
+              <a:t>Data e hora de um atendimento, da apresentação de PLP...</a:t>
+            </a:r>
+          </a:p>
+          <a:p>
+            <a:pPr marL="0" indent="0">
+              <a:buNone/>
+            </a:pPr>
+            <a:r>
+              <a:rPr lang="pt-BR" dirty="0" err="1"/>
+              <a:t>LocalDateTime.of</a:t>
+            </a:r>
+            <a:r>
+              <a:rPr lang="pt-BR" dirty="0"/>
+              <a:t>(2017, </a:t>
+            </a:r>
+            <a:r>
+              <a:rPr lang="pt-BR" dirty="0" err="1"/>
+              <a:t>Thurth.MAY</a:t>
+            </a:r>
+            <a:r>
+              <a:rPr lang="pt-BR" dirty="0"/>
+              <a:t>, 04, 8, 50);</a:t>
+            </a:r>
+          </a:p>
+        </p:txBody>
+      </p:sp>
+    </p:spTree>
+    <p:extLst>
+      <p:ext uri="{BB962C8B-B14F-4D97-AF65-F5344CB8AC3E}">
+        <p14:creationId xmlns:p14="http://schemas.microsoft.com/office/powerpoint/2010/main" val="703884644"/>
+      </p:ext>
+    </p:extLst>
+  </p:cSld>
+  <p:clrMapOvr>
+    <a:masterClrMapping/>
+  </p:clrMapOvr>
+</p:sld>
+</file>
+
+<file path=ppt/slides/slide13.xml><?xml version="1.0" encoding="utf-8"?>
+<p:sld xmlns:a="http://schemas.openxmlformats.org/drawingml/2006/main" xmlns:r="http://schemas.openxmlformats.org/officeDocument/2006/relationships" xmlns:p="http://schemas.openxmlformats.org/presentationml/2006/main">
+  <p:cSld>
+    <p:spTree>
+      <p:nvGrpSpPr>
+        <p:cNvPr id="1" name=""/>
+        <p:cNvGrpSpPr/>
+        <p:nvPr/>
+      </p:nvGrpSpPr>
+      <p:grpSpPr>
+        <a:xfrm>
+          <a:off x="0" y="0"/>
+          <a:ext cx="0" cy="0"/>
+          <a:chOff x="0" y="0"/>
+          <a:chExt cx="0" cy="0"/>
+        </a:xfrm>
+      </p:grpSpPr>
+      <p:sp>
+        <p:nvSpPr>
+          <p:cNvPr id="2" name="Título 1"/>
+          <p:cNvSpPr>
+            <a:spLocks noGrp="1"/>
+          </p:cNvSpPr>
+          <p:nvPr>
+            <p:ph type="title"/>
+          </p:nvPr>
+        </p:nvSpPr>
+        <p:spPr/>
+        <p:txBody>
+          <a:bodyPr/>
+          <a:lstStyle/>
+          <a:p>
+            <a:r>
+              <a:rPr lang="pt-BR" dirty="0"/>
+              <a:t>Antes</a:t>
+            </a:r>
+          </a:p>
+        </p:txBody>
+      </p:sp>
+      <p:sp>
+        <p:nvSpPr>
+          <p:cNvPr id="6" name="Espaço Reservado para Conteúdo 5"/>
+          <p:cNvSpPr>
+            <a:spLocks noGrp="1"/>
+          </p:cNvSpPr>
+          <p:nvPr>
+            <p:ph idx="1"/>
+          </p:nvPr>
+        </p:nvSpPr>
+        <p:spPr/>
+        <p:txBody>
+          <a:bodyPr/>
+          <a:lstStyle/>
+          <a:p>
+            <a:endParaRPr lang="pt-BR"/>
+          </a:p>
+        </p:txBody>
+      </p:sp>
+      <p:pic>
+        <p:nvPicPr>
+          <p:cNvPr id="8" name="Imagem 7"/>
+          <p:cNvPicPr>
+            <a:picLocks noChangeAspect="1"/>
+          </p:cNvPicPr>
+          <p:nvPr/>
+        </p:nvPicPr>
+        <p:blipFill>
+          <a:blip r:embed="rId2"/>
+          <a:stretch>
+            <a:fillRect/>
+          </a:stretch>
+        </p:blipFill>
+        <p:spPr>
+          <a:xfrm>
+            <a:off x="677334" y="2160589"/>
+            <a:ext cx="6510866" cy="2044615"/>
+          </a:xfrm>
+          <a:prstGeom prst="rect">
+            <a:avLst/>
+          </a:prstGeom>
+        </p:spPr>
+      </p:pic>
+    </p:spTree>
+    <p:extLst>
+      <p:ext uri="{BB962C8B-B14F-4D97-AF65-F5344CB8AC3E}">
+        <p14:creationId xmlns:p14="http://schemas.microsoft.com/office/powerpoint/2010/main" val="3387862657"/>
+      </p:ext>
+    </p:extLst>
+  </p:cSld>
+  <p:clrMapOvr>
+    <a:masterClrMapping/>
+  </p:clrMapOvr>
+</p:sld>
+</file>
+
+<file path=ppt/slides/slide14.xml><?xml version="1.0" encoding="utf-8"?>
+<p:sld xmlns:a="http://schemas.openxmlformats.org/drawingml/2006/main" xmlns:r="http://schemas.openxmlformats.org/officeDocument/2006/relationships" xmlns:p="http://schemas.openxmlformats.org/presentationml/2006/main">
+  <p:cSld>
+    <p:spTree>
+      <p:nvGrpSpPr>
+        <p:cNvPr id="1" name=""/>
+        <p:cNvGrpSpPr/>
+        <p:nvPr/>
+      </p:nvGrpSpPr>
+      <p:grpSpPr>
+        <a:xfrm>
+          <a:off x="0" y="0"/>
+          <a:ext cx="0" cy="0"/>
+          <a:chOff x="0" y="0"/>
+          <a:chExt cx="0" cy="0"/>
+        </a:xfrm>
+      </p:grpSpPr>
+      <p:sp>
+        <p:nvSpPr>
+          <p:cNvPr id="2" name="Título 1"/>
+          <p:cNvSpPr>
+            <a:spLocks noGrp="1"/>
+          </p:cNvSpPr>
+          <p:nvPr>
+            <p:ph type="title"/>
+          </p:nvPr>
+        </p:nvSpPr>
+        <p:spPr>
+          <a:xfrm>
+            <a:off x="677334" y="452718"/>
+            <a:ext cx="9373500" cy="1400530"/>
+          </a:xfrm>
+        </p:spPr>
+        <p:txBody>
+          <a:bodyPr/>
+          <a:lstStyle/>
+          <a:p>
+            <a:r>
+              <a:rPr lang="pt-BR" dirty="0"/>
+              <a:t>Agora</a:t>
+            </a:r>
+          </a:p>
+        </p:txBody>
+      </p:sp>
+      <p:sp>
+        <p:nvSpPr>
+          <p:cNvPr id="3" name="Espaço Reservado para Conteúdo 2"/>
+          <p:cNvSpPr>
+            <a:spLocks noGrp="1"/>
+          </p:cNvSpPr>
+          <p:nvPr>
+            <p:ph idx="1"/>
+          </p:nvPr>
+        </p:nvSpPr>
+        <p:spPr/>
+        <p:txBody>
+          <a:bodyPr/>
+          <a:lstStyle/>
+          <a:p>
+            <a:pPr marL="0" indent="0">
+              <a:buNone/>
+            </a:pPr>
+            <a:endParaRPr lang="pt-BR" dirty="0"/>
+          </a:p>
+        </p:txBody>
+      </p:sp>
+      <p:pic>
+        <p:nvPicPr>
+          <p:cNvPr id="6" name="Imagem 5"/>
+          <p:cNvPicPr>
+            <a:picLocks noChangeAspect="1"/>
+          </p:cNvPicPr>
+          <p:nvPr/>
+        </p:nvPicPr>
+        <p:blipFill>
+          <a:blip r:embed="rId2"/>
+          <a:stretch>
+            <a:fillRect/>
+          </a:stretch>
+        </p:blipFill>
+        <p:spPr>
+          <a:xfrm>
+            <a:off x="677334" y="2160589"/>
+            <a:ext cx="7607117" cy="1763711"/>
           </a:xfrm>
           <a:prstGeom prst="rect">
             <a:avLst/>
@@ -6168,7 +6440,7 @@
 </p:sld>
 </file>
 
-<file path=ppt/slides/slide12.xml><?xml version="1.0" encoding="utf-8"?>
+<file path=ppt/slides/slide15.xml><?xml version="1.0" encoding="utf-8"?>
 <p:sld xmlns:a="http://schemas.openxmlformats.org/drawingml/2006/main" xmlns:r="http://schemas.openxmlformats.org/officeDocument/2006/relationships" xmlns:p="http://schemas.openxmlformats.org/presentationml/2006/main">
   <p:cSld>
     <p:spTree>
@@ -6906,7 +7178,7 @@
 </p:sld>
 </file>
 
-<file path=ppt/slides/slide13.xml><?xml version="1.0" encoding="utf-8"?>
+<file path=ppt/slides/slide16.xml><?xml version="1.0" encoding="utf-8"?>
 <p:sld xmlns:a="http://schemas.openxmlformats.org/drawingml/2006/main" xmlns:r="http://schemas.openxmlformats.org/officeDocument/2006/relationships" xmlns:p="http://schemas.openxmlformats.org/presentationml/2006/main">
   <p:cSld>
     <p:spTree>
@@ -7809,15 +8081,7 @@
             </a:pPr>
             <a:r>
               <a:rPr lang="pt-BR" dirty="0"/>
-              <a:t>Datas </a:t>
-            </a:r>
-            <a:r>
-              <a:rPr lang="pt-BR" dirty="0" err="1"/>
-              <a:t>consistêm</a:t>
-            </a:r>
-            <a:r>
-              <a:rPr lang="pt-BR" dirty="0"/>
-              <a:t> em dia, mês e ano  </a:t>
+              <a:t>Datas consistem em dia, mês e ano  </a:t>
             </a:r>
           </a:p>
           <a:p>
@@ -7843,11 +8107,11 @@
             </a:r>
             <a:r>
               <a:rPr lang="pt-BR" dirty="0" err="1"/>
-              <a:t>Thurth.MAY</a:t>
+              <a:t>Fri.MAY</a:t>
             </a:r>
             <a:r>
               <a:rPr lang="pt-BR" dirty="0"/>
-              <a:t>, 04);</a:t>
+              <a:t>, 05);</a:t>
             </a:r>
           </a:p>
           <a:p>
@@ -7898,56 +8162,27 @@
             <p:ph type="title"/>
           </p:nvPr>
         </p:nvSpPr>
-        <p:spPr>
-          <a:xfrm>
-            <a:off x="1103312" y="452718"/>
-            <a:ext cx="8947522" cy="1400530"/>
-          </a:xfrm>
-        </p:spPr>
+        <p:spPr/>
         <p:txBody>
           <a:bodyPr/>
           <a:lstStyle/>
           <a:p>
             <a:r>
-              <a:rPr lang="pt-BR" dirty="0" err="1"/>
-              <a:t>Ex</a:t>
-            </a:r>
-            <a:r>
               <a:rPr lang="pt-BR" dirty="0"/>
-              <a:t>:</a:t>
-            </a:r>
-          </a:p>
-        </p:txBody>
-      </p:sp>
-      <p:sp>
-        <p:nvSpPr>
-          <p:cNvPr id="3" name="Espaço Reservado para Conteúdo 2"/>
-          <p:cNvSpPr>
-            <a:spLocks noGrp="1"/>
-          </p:cNvSpPr>
-          <p:nvPr>
-            <p:ph idx="1"/>
-          </p:nvPr>
-        </p:nvSpPr>
-        <p:spPr/>
-        <p:txBody>
-          <a:bodyPr/>
-          <a:lstStyle/>
-          <a:p>
-            <a:pPr marL="0" indent="0">
-              <a:buNone/>
-            </a:pPr>
-            <a:endParaRPr lang="pt-BR" dirty="0"/>
+              <a:t>Antes</a:t>
+            </a:r>
           </a:p>
         </p:txBody>
       </p:sp>
       <p:pic>
         <p:nvPicPr>
-          <p:cNvPr id="4" name="Imagem 3"/>
+          <p:cNvPr id="6" name="Espaço Reservado para Conteúdo 5"/>
           <p:cNvPicPr>
-            <a:picLocks noChangeAspect="1"/>
+            <a:picLocks noGrp="1" noChangeAspect="1"/>
           </p:cNvPicPr>
-          <p:nvPr/>
+          <p:nvPr>
+            <p:ph idx="1"/>
+          </p:nvPr>
         </p:nvPicPr>
         <p:blipFill>
           <a:blip r:embed="rId2"/>
@@ -7957,8 +8192,8 @@
         </p:blipFill>
         <p:spPr>
           <a:xfrm>
-            <a:off x="677334" y="2851295"/>
-            <a:ext cx="8946541" cy="1557718"/>
+            <a:off x="677333" y="1930400"/>
+            <a:ext cx="8075319" cy="1841500"/>
           </a:xfrm>
           <a:prstGeom prst="rect">
             <a:avLst/>
@@ -7968,7 +8203,7 @@
     </p:spTree>
     <p:extLst>
       <p:ext uri="{BB962C8B-B14F-4D97-AF65-F5344CB8AC3E}">
-        <p14:creationId xmlns:p14="http://schemas.microsoft.com/office/powerpoint/2010/main" val="3242110629"/>
+        <p14:creationId xmlns:p14="http://schemas.microsoft.com/office/powerpoint/2010/main" val="856727194"/>
       </p:ext>
     </p:extLst>
   </p:cSld>
@@ -8007,8 +8242,8 @@
         </p:nvSpPr>
         <p:spPr>
           <a:xfrm>
-            <a:off x="1103312" y="452718"/>
-            <a:ext cx="8947522" cy="1400530"/>
+            <a:off x="677334" y="452718"/>
+            <a:ext cx="9373500" cy="1400530"/>
           </a:xfrm>
         </p:spPr>
         <p:txBody>
@@ -8017,7 +8252,7 @@
           <a:p>
             <a:r>
               <a:rPr lang="pt-BR" dirty="0"/>
-              <a:t>Hora</a:t>
+              <a:t>Agora</a:t>
             </a:r>
           </a:p>
         </p:txBody>
@@ -8040,60 +8275,38 @@
             <a:pPr marL="0" indent="0">
               <a:buNone/>
             </a:pPr>
-            <a:r>
-              <a:rPr lang="pt-BR" sz="2800" dirty="0" err="1"/>
-              <a:t>LocalTime</a:t>
-            </a:r>
-            <a:r>
-              <a:rPr lang="pt-BR" sz="2800" dirty="0"/>
-              <a:t> (Sem Data) </a:t>
-            </a:r>
-          </a:p>
-          <a:p>
-            <a:pPr marL="0" indent="0">
-              <a:buNone/>
-            </a:pPr>
-            <a:r>
-              <a:rPr lang="pt-BR" dirty="0"/>
-              <a:t> Horários </a:t>
-            </a:r>
-            <a:r>
-              <a:rPr lang="pt-BR" dirty="0" err="1"/>
-              <a:t>consitêm</a:t>
-            </a:r>
-            <a:r>
-              <a:rPr lang="pt-BR" dirty="0"/>
-              <a:t> em hora, minutos e segundos ○ </a:t>
-            </a:r>
-          </a:p>
-          <a:p>
-            <a:pPr marL="0" indent="0">
-              <a:buNone/>
-            </a:pPr>
-            <a:r>
-              <a:rPr lang="pt-BR" dirty="0"/>
-              <a:t>Horário de início da aula, horário do despertador</a:t>
-            </a:r>
-          </a:p>
-          <a:p>
-            <a:pPr marL="0" indent="0">
-              <a:buNone/>
-            </a:pPr>
-            <a:r>
-              <a:rPr lang="pt-BR" dirty="0" err="1"/>
-              <a:t>LocalTime.of</a:t>
-            </a:r>
-            <a:r>
-              <a:rPr lang="pt-BR" dirty="0"/>
-              <a:t>(8, 45);</a:t>
-            </a:r>
-          </a:p>
-        </p:txBody>
-      </p:sp>
+            <a:endParaRPr lang="pt-BR" dirty="0"/>
+          </a:p>
+        </p:txBody>
+      </p:sp>
+      <p:pic>
+        <p:nvPicPr>
+          <p:cNvPr id="5" name="Imagem 4"/>
+          <p:cNvPicPr>
+            <a:picLocks noChangeAspect="1"/>
+          </p:cNvPicPr>
+          <p:nvPr/>
+        </p:nvPicPr>
+        <p:blipFill>
+          <a:blip r:embed="rId2"/>
+          <a:stretch>
+            <a:fillRect/>
+          </a:stretch>
+        </p:blipFill>
+        <p:spPr>
+          <a:xfrm>
+            <a:off x="677334" y="2278876"/>
+            <a:ext cx="6722272" cy="1701575"/>
+          </a:xfrm>
+          <a:prstGeom prst="rect">
+            <a:avLst/>
+          </a:prstGeom>
+        </p:spPr>
+      </p:pic>
     </p:spTree>
     <p:extLst>
       <p:ext uri="{BB962C8B-B14F-4D97-AF65-F5344CB8AC3E}">
-        <p14:creationId xmlns:p14="http://schemas.microsoft.com/office/powerpoint/2010/main" val="875036158"/>
+        <p14:creationId xmlns:p14="http://schemas.microsoft.com/office/powerpoint/2010/main" val="3242110629"/>
       </p:ext>
     </p:extLst>
   </p:cSld>
@@ -8132,8 +8345,8 @@
         </p:nvSpPr>
         <p:spPr>
           <a:xfrm>
-            <a:off x="1078194" y="452718"/>
-            <a:ext cx="8972640" cy="1400530"/>
+            <a:off x="677334" y="452718"/>
+            <a:ext cx="9373500" cy="1400530"/>
           </a:xfrm>
         </p:spPr>
         <p:txBody>
@@ -8141,46 +8354,76 @@
           <a:lstStyle/>
           <a:p>
             <a:r>
+              <a:rPr lang="pt-BR" dirty="0"/>
+              <a:t>Hora</a:t>
+            </a:r>
+          </a:p>
+        </p:txBody>
+      </p:sp>
+      <p:sp>
+        <p:nvSpPr>
+          <p:cNvPr id="3" name="Espaço Reservado para Conteúdo 2"/>
+          <p:cNvSpPr>
+            <a:spLocks noGrp="1"/>
+          </p:cNvSpPr>
+          <p:nvPr>
+            <p:ph idx="1"/>
+          </p:nvPr>
+        </p:nvSpPr>
+        <p:spPr/>
+        <p:txBody>
+          <a:bodyPr/>
+          <a:lstStyle/>
+          <a:p>
+            <a:pPr marL="0" indent="0">
+              <a:buNone/>
+            </a:pPr>
+            <a:r>
+              <a:rPr lang="pt-BR" sz="2800" dirty="0" err="1"/>
+              <a:t>LocalTime</a:t>
+            </a:r>
+            <a:r>
+              <a:rPr lang="pt-BR" sz="2800" dirty="0"/>
+              <a:t> (Sem Data) </a:t>
+            </a:r>
+          </a:p>
+          <a:p>
+            <a:pPr marL="0" indent="0">
+              <a:buNone/>
+            </a:pPr>
+            <a:r>
+              <a:rPr lang="pt-BR" dirty="0"/>
+              <a:t> Horários consistem em hora, minutos e segundos ○ </a:t>
+            </a:r>
+          </a:p>
+          <a:p>
+            <a:pPr marL="0" indent="0">
+              <a:buNone/>
+            </a:pPr>
+            <a:r>
+              <a:rPr lang="pt-BR" dirty="0"/>
+              <a:t>Horário de início da aula, horário do despertador</a:t>
+            </a:r>
+          </a:p>
+          <a:p>
+            <a:pPr marL="0" indent="0">
+              <a:buNone/>
+            </a:pPr>
+            <a:r>
               <a:rPr lang="pt-BR" dirty="0" err="1"/>
-              <a:t>Ex</a:t>
+              <a:t>LocalTime.of</a:t>
             </a:r>
             <a:r>
               <a:rPr lang="pt-BR" dirty="0"/>
-              <a:t>:</a:t>
-            </a:r>
-          </a:p>
-        </p:txBody>
-      </p:sp>
-      <p:pic>
-        <p:nvPicPr>
-          <p:cNvPr id="4" name="Espaço Reservado para Conteúdo 3"/>
-          <p:cNvPicPr>
-            <a:picLocks noGrp="1" noChangeAspect="1"/>
-          </p:cNvPicPr>
-          <p:nvPr>
-            <p:ph idx="1"/>
-          </p:nvPr>
-        </p:nvPicPr>
-        <p:blipFill>
-          <a:blip r:embed="rId2"/>
-          <a:stretch>
-            <a:fillRect/>
-          </a:stretch>
-        </p:blipFill>
-        <p:spPr>
-          <a:xfrm>
-            <a:off x="839042" y="2571415"/>
-            <a:ext cx="8972641" cy="1549976"/>
-          </a:xfrm>
-          <a:prstGeom prst="rect">
-            <a:avLst/>
-          </a:prstGeom>
-        </p:spPr>
-      </p:pic>
+              <a:t>(8, 45);</a:t>
+            </a:r>
+          </a:p>
+        </p:txBody>
+      </p:sp>
     </p:spTree>
     <p:extLst>
       <p:ext uri="{BB962C8B-B14F-4D97-AF65-F5344CB8AC3E}">
-        <p14:creationId xmlns:p14="http://schemas.microsoft.com/office/powerpoint/2010/main" val="1960338378"/>
+        <p14:creationId xmlns:p14="http://schemas.microsoft.com/office/powerpoint/2010/main" val="875036158"/>
       </p:ext>
     </p:extLst>
   </p:cSld>

</xml_diff>